<commit_message>
added law part, modified introduction
</commit_message>
<xml_diff>
--- a/Assignments/Presentations/2015.04.15Presentation_0.pptx
+++ b/Assignments/Presentations/2015.04.15Presentation_0.pptx
@@ -13,7 +13,8 @@
     <p:sldId id="268" r:id="rId7"/>
     <p:sldId id="258" r:id="rId8"/>
     <p:sldId id="260" r:id="rId9"/>
-    <p:sldId id="261" r:id="rId10"/>
+    <p:sldId id="272" r:id="rId10"/>
+    <p:sldId id="261" r:id="rId11"/>
   </p:sldIdLst>
   <p:sldSz cx="12192000" cy="6858000"/>
   <p:notesSz cx="6858000" cy="9144000"/>
@@ -176,6 +177,7 @@
           </a:p>
         </c:rich>
       </c:tx>
+      <c:layout/>
       <c:overlay val="0"/>
       <c:spPr>
         <a:noFill/>
@@ -357,11 +359,11 @@
         </c:dLbls>
         <c:gapWidth val="150"/>
         <c:overlap val="100"/>
-        <c:axId val="136283872"/>
-        <c:axId val="136284432"/>
+        <c:axId val="140984736"/>
+        <c:axId val="140985296"/>
       </c:barChart>
       <c:catAx>
-        <c:axId val="136283872"/>
+        <c:axId val="140984736"/>
         <c:scaling>
           <c:orientation val="minMax"/>
         </c:scaling>
@@ -404,7 +406,7 @@
             <a:endParaRPr lang="de-DE"/>
           </a:p>
         </c:txPr>
-        <c:crossAx val="136284432"/>
+        <c:crossAx val="140985296"/>
         <c:crosses val="autoZero"/>
         <c:auto val="1"/>
         <c:lblAlgn val="ctr"/>
@@ -412,7 +414,7 @@
         <c:noMultiLvlLbl val="0"/>
       </c:catAx>
       <c:valAx>
-        <c:axId val="136284432"/>
+        <c:axId val="140985296"/>
         <c:scaling>
           <c:orientation val="minMax"/>
         </c:scaling>
@@ -531,7 +533,7 @@
             <a:endParaRPr lang="de-DE"/>
           </a:p>
         </c:txPr>
-        <c:crossAx val="136283872"/>
+        <c:crossAx val="140984736"/>
         <c:crosses val="autoZero"/>
         <c:crossBetween val="between"/>
       </c:valAx>
@@ -618,6 +620,7 @@
           </a:p>
         </c:rich>
       </c:tx>
+      <c:layout/>
       <c:overlay val="0"/>
       <c:spPr>
         <a:noFill/>
@@ -823,11 +826,11 @@
         </c:dLbls>
         <c:gapWidth val="150"/>
         <c:overlap val="100"/>
-        <c:axId val="136653232"/>
-        <c:axId val="136653792"/>
+        <c:axId val="140988096"/>
+        <c:axId val="140988656"/>
       </c:barChart>
       <c:catAx>
-        <c:axId val="136653232"/>
+        <c:axId val="140988096"/>
         <c:scaling>
           <c:orientation val="minMax"/>
         </c:scaling>
@@ -870,7 +873,7 @@
             <a:endParaRPr lang="de-DE"/>
           </a:p>
         </c:txPr>
-        <c:crossAx val="136653792"/>
+        <c:crossAx val="140988656"/>
         <c:crosses val="autoZero"/>
         <c:auto val="1"/>
         <c:lblAlgn val="ctr"/>
@@ -878,7 +881,7 @@
         <c:noMultiLvlLbl val="0"/>
       </c:catAx>
       <c:valAx>
-        <c:axId val="136653792"/>
+        <c:axId val="140988656"/>
         <c:scaling>
           <c:orientation val="minMax"/>
         </c:scaling>
@@ -997,7 +1000,7 @@
             <a:endParaRPr lang="de-DE"/>
           </a:p>
         </c:txPr>
-        <c:crossAx val="136653232"/>
+        <c:crossAx val="140988096"/>
         <c:crosses val="autoZero"/>
         <c:crossBetween val="between"/>
       </c:valAx>
@@ -3890,8 +3893,8 @@
     <dgm:cxn modelId="{B5C73BD3-7E4C-40C2-A95E-ADF73D8B2256}" srcId="{B0E30588-1614-4F1A-B863-E835765ED56C}" destId="{4BC937DE-DF2D-4FFA-B88A-E5338D433781}" srcOrd="0" destOrd="0" parTransId="{1835388E-52BA-4E72-8792-3A12EDB4C03B}" sibTransId="{F59B1304-AA1E-4810-9E72-0861E45F8AE6}"/>
     <dgm:cxn modelId="{8A517DDD-C1DF-4CAA-AAE5-CCDE04277E9B}" type="presOf" srcId="{173A95D6-627F-4EE4-B440-3E9FBF53A473}" destId="{B790B033-8861-44F9-A411-A64891A1F78D}" srcOrd="0" destOrd="0" presId="urn:microsoft.com/office/officeart/2005/8/layout/hList6"/>
     <dgm:cxn modelId="{AA84AAB7-CA17-40C5-A465-15DA0C289E43}" srcId="{C9B12C90-8B57-400E-AFDB-85B1CC8B63C9}" destId="{A446800D-2712-4870-A860-B80692232F7F}" srcOrd="1" destOrd="0" parTransId="{D5CB3F02-2D52-4C7C-B42D-1F2F79D73300}" sibTransId="{21E781E9-0AC7-4C2B-9DB1-F96922E5188D}"/>
+    <dgm:cxn modelId="{88D56E5A-A386-4511-98DB-B41DB3305915}" type="presOf" srcId="{127057A1-3005-47EE-9DA0-5BB7EF177F1C}" destId="{07112225-DBE3-4767-B863-B33AE5135511}" srcOrd="0" destOrd="3" presId="urn:microsoft.com/office/officeart/2005/8/layout/hList6"/>
     <dgm:cxn modelId="{C1EB94C4-3409-4152-8092-E35309B80ED3}" type="presOf" srcId="{4BC937DE-DF2D-4FFA-B88A-E5338D433781}" destId="{E2944459-30FB-4A39-B98C-CA50DEBD0FE0}" srcOrd="0" destOrd="0" presId="urn:microsoft.com/office/officeart/2005/8/layout/hList6"/>
-    <dgm:cxn modelId="{88D56E5A-A386-4511-98DB-B41DB3305915}" type="presOf" srcId="{127057A1-3005-47EE-9DA0-5BB7EF177F1C}" destId="{07112225-DBE3-4767-B863-B33AE5135511}" srcOrd="0" destOrd="3" presId="urn:microsoft.com/office/officeart/2005/8/layout/hList6"/>
     <dgm:cxn modelId="{56A39AAE-6DA0-429E-9B61-C1B68FD07691}" type="presParOf" srcId="{3E78A654-C050-4A6D-AE20-E7E88B2A53F2}" destId="{E2944459-30FB-4A39-B98C-CA50DEBD0FE0}" srcOrd="0" destOrd="0" presId="urn:microsoft.com/office/officeart/2005/8/layout/hList6"/>
     <dgm:cxn modelId="{EBC8954A-EE2E-4089-B4B5-DB4EA99C6E58}" type="presParOf" srcId="{3E78A654-C050-4A6D-AE20-E7E88B2A53F2}" destId="{50494F57-9413-46C6-806C-1F0BC7375A67}" srcOrd="1" destOrd="0" presId="urn:microsoft.com/office/officeart/2005/8/layout/hList6"/>
     <dgm:cxn modelId="{7FA9A8C4-0A23-48D0-A95B-976E3B06590C}" type="presParOf" srcId="{3E78A654-C050-4A6D-AE20-E7E88B2A53F2}" destId="{07112225-DBE3-4767-B863-B33AE5135511}" srcOrd="2" destOrd="0" presId="urn:microsoft.com/office/officeart/2005/8/layout/hList6"/>
@@ -6060,7 +6063,7 @@
           <a:p>
             <a:fld id="{02F0B32B-ED32-4907-B4C8-E651EEA6C8DE}" type="datetimeFigureOut">
               <a:rPr lang="fr-FR" smtClean="0"/>
-              <a:t>12/04/2015</a:t>
+              <a:t>13/04/2015</a:t>
             </a:fld>
             <a:endParaRPr lang="fr-FR"/>
           </a:p>
@@ -6268,7 +6271,7 @@
           <a:p>
             <a:fld id="{02F0B32B-ED32-4907-B4C8-E651EEA6C8DE}" type="datetimeFigureOut">
               <a:rPr lang="fr-FR" smtClean="0"/>
-              <a:t>12/04/2015</a:t>
+              <a:t>13/04/2015</a:t>
             </a:fld>
             <a:endParaRPr lang="fr-FR"/>
           </a:p>
@@ -6524,7 +6527,7 @@
           <a:p>
             <a:fld id="{02F0B32B-ED32-4907-B4C8-E651EEA6C8DE}" type="datetimeFigureOut">
               <a:rPr lang="fr-FR" smtClean="0"/>
-              <a:t>12/04/2015</a:t>
+              <a:t>13/04/2015</a:t>
             </a:fld>
             <a:endParaRPr lang="fr-FR"/>
           </a:p>
@@ -6694,7 +6697,7 @@
           <a:p>
             <a:fld id="{02F0B32B-ED32-4907-B4C8-E651EEA6C8DE}" type="datetimeFigureOut">
               <a:rPr lang="fr-FR" smtClean="0"/>
-              <a:t>12/04/2015</a:t>
+              <a:t>13/04/2015</a:t>
             </a:fld>
             <a:endParaRPr lang="fr-FR"/>
           </a:p>
@@ -7037,7 +7040,7 @@
           <a:p>
             <a:fld id="{02F0B32B-ED32-4907-B4C8-E651EEA6C8DE}" type="datetimeFigureOut">
               <a:rPr lang="fr-FR" smtClean="0"/>
-              <a:t>12/04/2015</a:t>
+              <a:t>13/04/2015</a:t>
             </a:fld>
             <a:endParaRPr lang="fr-FR"/>
           </a:p>
@@ -7312,7 +7315,7 @@
           <a:p>
             <a:fld id="{02F0B32B-ED32-4907-B4C8-E651EEA6C8DE}" type="datetimeFigureOut">
               <a:rPr lang="fr-FR" smtClean="0"/>
-              <a:t>12/04/2015</a:t>
+              <a:t>13/04/2015</a:t>
             </a:fld>
             <a:endParaRPr lang="fr-FR"/>
           </a:p>
@@ -7691,7 +7694,7 @@
           <a:p>
             <a:fld id="{02F0B32B-ED32-4907-B4C8-E651EEA6C8DE}" type="datetimeFigureOut">
               <a:rPr lang="fr-FR" smtClean="0"/>
-              <a:t>12/04/2015</a:t>
+              <a:t>13/04/2015</a:t>
             </a:fld>
             <a:endParaRPr lang="fr-FR"/>
           </a:p>
@@ -7809,7 +7812,7 @@
           <a:p>
             <a:fld id="{02F0B32B-ED32-4907-B4C8-E651EEA6C8DE}" type="datetimeFigureOut">
               <a:rPr lang="fr-FR" smtClean="0"/>
-              <a:t>12/04/2015</a:t>
+              <a:t>13/04/2015</a:t>
             </a:fld>
             <a:endParaRPr lang="fr-FR"/>
           </a:p>
@@ -7980,7 +7983,7 @@
           <a:p>
             <a:fld id="{02F0B32B-ED32-4907-B4C8-E651EEA6C8DE}" type="datetimeFigureOut">
               <a:rPr lang="fr-FR" smtClean="0"/>
-              <a:t>12/04/2015</a:t>
+              <a:t>13/04/2015</a:t>
             </a:fld>
             <a:endParaRPr lang="fr-FR"/>
           </a:p>
@@ -8334,7 +8337,7 @@
           <a:p>
             <a:fld id="{02F0B32B-ED32-4907-B4C8-E651EEA6C8DE}" type="datetimeFigureOut">
               <a:rPr lang="fr-FR" smtClean="0"/>
-              <a:t>12/04/2015</a:t>
+              <a:t>13/04/2015</a:t>
             </a:fld>
             <a:endParaRPr lang="fr-FR"/>
           </a:p>
@@ -8711,7 +8714,7 @@
           <a:p>
             <a:fld id="{02F0B32B-ED32-4907-B4C8-E651EEA6C8DE}" type="datetimeFigureOut">
               <a:rPr lang="fr-FR" smtClean="0"/>
-              <a:t>12/04/2015</a:t>
+              <a:t>13/04/2015</a:t>
             </a:fld>
             <a:endParaRPr lang="fr-FR"/>
           </a:p>
@@ -8998,7 +9001,7 @@
           <a:p>
             <a:fld id="{02F0B32B-ED32-4907-B4C8-E651EEA6C8DE}" type="datetimeFigureOut">
               <a:rPr lang="fr-FR" smtClean="0"/>
-              <a:t>12/04/2015</a:t>
+              <a:t>13/04/2015</a:t>
             </a:fld>
             <a:endParaRPr lang="fr-FR"/>
           </a:p>
@@ -9706,6 +9709,91 @@
 </p:sld>
 </file>
 
+<file path=ppt/slides/slide10.xml><?xml version="1.0" encoding="utf-8"?>
+<p:sld xmlns:a="http://schemas.openxmlformats.org/drawingml/2006/main" xmlns:r="http://schemas.openxmlformats.org/officeDocument/2006/relationships" xmlns:p="http://schemas.openxmlformats.org/presentationml/2006/main">
+  <p:cSld>
+    <p:spTree>
+      <p:nvGrpSpPr>
+        <p:cNvPr id="1" name=""/>
+        <p:cNvGrpSpPr/>
+        <p:nvPr/>
+      </p:nvGrpSpPr>
+      <p:grpSpPr>
+        <a:xfrm>
+          <a:off x="0" y="0"/>
+          <a:ext cx="0" cy="0"/>
+          <a:chOff x="0" y="0"/>
+          <a:chExt cx="0" cy="0"/>
+        </a:xfrm>
+      </p:grpSpPr>
+      <p:sp>
+        <p:nvSpPr>
+          <p:cNvPr id="2" name="标题 1"/>
+          <p:cNvSpPr>
+            <a:spLocks noGrp="1"/>
+          </p:cNvSpPr>
+          <p:nvPr>
+            <p:ph type="title"/>
+          </p:nvPr>
+        </p:nvSpPr>
+        <p:spPr/>
+        <p:txBody>
+          <a:bodyPr/>
+          <a:lstStyle/>
+          <a:p>
+            <a:r>
+              <a:rPr lang="en-US" altLang="zh-CN" noProof="0" dirty="0" smtClean="0"/>
+              <a:t>LOGIC MODEL</a:t>
+            </a:r>
+            <a:endParaRPr lang="en-US" altLang="zh-CN" noProof="0" dirty="0"/>
+          </a:p>
+        </p:txBody>
+      </p:sp>
+      <p:graphicFrame>
+        <p:nvGraphicFramePr>
+          <p:cNvPr id="4" name="Espace réservé du contenu 3"/>
+          <p:cNvGraphicFramePr>
+            <a:graphicFrameLocks noGrp="1"/>
+          </p:cNvGraphicFramePr>
+          <p:nvPr>
+            <p:ph idx="1"/>
+            <p:extLst>
+              <p:ext uri="{D42A27DB-BD31-4B8C-83A1-F6EECF244321}">
+                <p14:modId xmlns:p14="http://schemas.microsoft.com/office/powerpoint/2010/main" val="223621739"/>
+              </p:ext>
+            </p:extLst>
+          </p:nvPr>
+        </p:nvGraphicFramePr>
+        <p:xfrm>
+          <a:off x="1096963" y="1846270"/>
+          <a:ext cx="10058400" cy="4022725"/>
+        </p:xfrm>
+        <a:graphic>
+          <a:graphicData uri="http://schemas.openxmlformats.org/drawingml/2006/diagram">
+            <dgm:relIds xmlns:dgm="http://schemas.openxmlformats.org/drawingml/2006/diagram" xmlns:r="http://schemas.openxmlformats.org/officeDocument/2006/relationships" r:dm="rId2" r:lo="rId3" r:qs="rId4" r:cs="rId5"/>
+          </a:graphicData>
+        </a:graphic>
+      </p:graphicFrame>
+    </p:spTree>
+    <p:extLst>
+      <p:ext uri="{BB962C8B-B14F-4D97-AF65-F5344CB8AC3E}">
+        <p14:creationId xmlns:p14="http://schemas.microsoft.com/office/powerpoint/2010/main" val="1942553195"/>
+      </p:ext>
+    </p:extLst>
+  </p:cSld>
+  <p:clrMapOvr>
+    <a:masterClrMapping/>
+  </p:clrMapOvr>
+  <p:timing>
+    <p:tnLst>
+      <p:par>
+        <p:cTn id="1" dur="indefinite" restart="never" nodeType="tmRoot"/>
+      </p:par>
+    </p:tnLst>
+  </p:timing>
+</p:sld>
+</file>
+
 <file path=ppt/slides/slide2.xml><?xml version="1.0" encoding="utf-8"?>
 <p:sld xmlns:a="http://schemas.openxmlformats.org/drawingml/2006/main" xmlns:r="http://schemas.openxmlformats.org/officeDocument/2006/relationships" xmlns:p="http://schemas.openxmlformats.org/presentationml/2006/main">
   <p:cSld>
@@ -9756,7 +9844,19 @@
             <p:ph idx="1"/>
           </p:nvPr>
         </p:nvSpPr>
-        <p:spPr/>
+        <p:spPr>
+          <a:xfrm>
+            <a:off x="1097280" y="1926416"/>
+            <a:ext cx="4947894" cy="807083"/>
+          </a:xfrm>
+          <a:ln>
+            <a:solidFill>
+              <a:schemeClr val="bg1">
+                <a:lumMod val="65000"/>
+              </a:schemeClr>
+            </a:solidFill>
+          </a:ln>
+        </p:spPr>
         <p:txBody>
           <a:bodyPr/>
           <a:lstStyle/>
@@ -9777,25 +9877,13 @@
             </a:pPr>
             <a:r>
               <a:rPr lang="en-US" noProof="0" dirty="0" smtClean="0"/>
-              <a:t>Provide public information about fuel cells</a:t>
-            </a:r>
-          </a:p>
-          <a:p>
-            <a:pPr marL="266687" indent="-177792">
-              <a:buFont typeface="Wingdings" panose="05000000000000000000" pitchFamily="2" charset="2"/>
-              <a:buChar char="§"/>
-            </a:pPr>
+              <a:t>Provide public information about fuel </a:t>
+            </a:r>
             <a:r>
               <a:rPr lang="en-US" noProof="0" dirty="0" smtClean="0"/>
-              <a:t>History of fuel cells:</a:t>
-            </a:r>
-          </a:p>
-          <a:p>
-            <a:pPr marL="559281" lvl="1" indent="-177792">
-              <a:buFont typeface="Wingdings" panose="05000000000000000000" pitchFamily="2" charset="2"/>
-              <a:buChar char="§"/>
-            </a:pPr>
-            <a:endParaRPr lang="en-US" noProof="0" dirty="0"/>
+              <a:t>cells</a:t>
+            </a:r>
+            <a:endParaRPr lang="en-US" noProof="0" dirty="0" smtClean="0"/>
           </a:p>
         </p:txBody>
       </p:sp>
@@ -9807,7 +9895,7 @@
         </p:nvSpPr>
         <p:spPr>
           <a:xfrm>
-            <a:off x="1097287" y="4545419"/>
+            <a:off x="1097287" y="5061101"/>
             <a:ext cx="10058399" cy="369332"/>
           </a:xfrm>
           <a:prstGeom prst="homePlate">
@@ -9855,7 +9943,7 @@
         </p:nvSpPr>
         <p:spPr>
           <a:xfrm rot="18900000">
-            <a:off x="942882" y="3279759"/>
+            <a:off x="942882" y="3795441"/>
             <a:ext cx="1998676" cy="646331"/>
           </a:xfrm>
           <a:prstGeom prst="rect">
@@ -9933,7 +10021,7 @@
         </p:nvSpPr>
         <p:spPr>
           <a:xfrm>
-            <a:off x="1140670" y="4545419"/>
+            <a:off x="1140670" y="5061101"/>
             <a:ext cx="673463" cy="369332"/>
           </a:xfrm>
           <a:prstGeom prst="rect">
@@ -9966,7 +10054,7 @@
         </p:nvSpPr>
         <p:spPr>
           <a:xfrm>
-            <a:off x="2082356" y="4545419"/>
+            <a:off x="2082356" y="5061101"/>
             <a:ext cx="673463" cy="369332"/>
           </a:xfrm>
           <a:prstGeom prst="rect">
@@ -9999,7 +10087,7 @@
         </p:nvSpPr>
         <p:spPr>
           <a:xfrm rot="18900000">
-            <a:off x="1890283" y="3279766"/>
+            <a:off x="1890283" y="3795448"/>
             <a:ext cx="1998676" cy="646331"/>
           </a:xfrm>
           <a:prstGeom prst="rect">
@@ -10109,7 +10197,7 @@
         </p:nvSpPr>
         <p:spPr>
           <a:xfrm>
-            <a:off x="3465046" y="4546066"/>
+            <a:off x="3465046" y="5061748"/>
             <a:ext cx="790547" cy="369332"/>
           </a:xfrm>
           <a:prstGeom prst="rect">
@@ -10142,7 +10230,7 @@
         </p:nvSpPr>
         <p:spPr>
           <a:xfrm rot="18900000">
-            <a:off x="3333846" y="3279766"/>
+            <a:off x="3333846" y="3795448"/>
             <a:ext cx="1998676" cy="646331"/>
           </a:xfrm>
           <a:prstGeom prst="rect">
@@ -10220,7 +10308,7 @@
         </p:nvSpPr>
         <p:spPr>
           <a:xfrm>
-            <a:off x="4723933" y="4544774"/>
+            <a:off x="4723933" y="5060456"/>
             <a:ext cx="790547" cy="369332"/>
           </a:xfrm>
           <a:prstGeom prst="rect">
@@ -10253,7 +10341,7 @@
         </p:nvSpPr>
         <p:spPr>
           <a:xfrm rot="18900000">
-            <a:off x="4611278" y="3279765"/>
+            <a:off x="4611278" y="3795447"/>
             <a:ext cx="1998676" cy="646331"/>
           </a:xfrm>
           <a:prstGeom prst="rect">
@@ -10318,7 +10406,7 @@
         </p:nvSpPr>
         <p:spPr>
           <a:xfrm>
-            <a:off x="6045174" y="4546262"/>
+            <a:off x="6045174" y="5061944"/>
             <a:ext cx="790547" cy="369332"/>
           </a:xfrm>
           <a:prstGeom prst="rect">
@@ -10351,7 +10439,7 @@
         </p:nvSpPr>
         <p:spPr>
           <a:xfrm rot="18900000">
-            <a:off x="5824275" y="3043324"/>
+            <a:off x="5824275" y="3559006"/>
             <a:ext cx="1998676" cy="923330"/>
           </a:xfrm>
           <a:prstGeom prst="rect">
@@ -10453,7 +10541,7 @@
         </p:nvSpPr>
         <p:spPr>
           <a:xfrm rot="18900000">
-            <a:off x="7375491" y="3043324"/>
+            <a:off x="7375491" y="3559006"/>
             <a:ext cx="1998676" cy="923330"/>
           </a:xfrm>
           <a:prstGeom prst="rect">
@@ -10547,7 +10635,7 @@
         </p:nvSpPr>
         <p:spPr>
           <a:xfrm>
-            <a:off x="7606141" y="4545419"/>
+            <a:off x="7606141" y="5061101"/>
             <a:ext cx="790547" cy="369332"/>
           </a:xfrm>
           <a:prstGeom prst="rect">
@@ -10580,7 +10668,7 @@
         </p:nvSpPr>
         <p:spPr>
           <a:xfrm rot="18900000">
-            <a:off x="8410599" y="3043324"/>
+            <a:off x="8410599" y="3559006"/>
             <a:ext cx="1998676" cy="923330"/>
           </a:xfrm>
           <a:prstGeom prst="rect">
@@ -10706,7 +10794,7 @@
         </p:nvSpPr>
         <p:spPr>
           <a:xfrm>
-            <a:off x="8622090" y="4538642"/>
+            <a:off x="8622090" y="5054324"/>
             <a:ext cx="790547" cy="369332"/>
           </a:xfrm>
           <a:prstGeom prst="rect">
@@ -10739,7 +10827,7 @@
         </p:nvSpPr>
         <p:spPr>
           <a:xfrm rot="18900000">
-            <a:off x="9391230" y="3279766"/>
+            <a:off x="9391230" y="3795448"/>
             <a:ext cx="1998676" cy="646331"/>
           </a:xfrm>
           <a:prstGeom prst="rect">
@@ -10841,7 +10929,7 @@
         </p:nvSpPr>
         <p:spPr>
           <a:xfrm>
-            <a:off x="9525942" y="4548850"/>
+            <a:off x="9525942" y="5064532"/>
             <a:ext cx="790547" cy="369332"/>
           </a:xfrm>
           <a:prstGeom prst="rect">
@@ -10862,6 +10950,302 @@
                 </a:solidFill>
               </a:rPr>
               <a:t>2009</a:t>
+            </a:r>
+          </a:p>
+        </p:txBody>
+      </p:sp>
+      <p:sp>
+        <p:nvSpPr>
+          <p:cNvPr id="33" name="Content Placeholder 2"/>
+          <p:cNvSpPr txBox="1">
+            <a:spLocks/>
+          </p:cNvSpPr>
+          <p:nvPr/>
+        </p:nvSpPr>
+        <p:spPr>
+          <a:xfrm>
+            <a:off x="6196651" y="1926415"/>
+            <a:ext cx="4947894" cy="807083"/>
+          </a:xfrm>
+          <a:prstGeom prst="rect">
+            <a:avLst/>
+          </a:prstGeom>
+          <a:ln>
+            <a:solidFill>
+              <a:schemeClr val="bg1">
+                <a:lumMod val="65000"/>
+              </a:schemeClr>
+            </a:solidFill>
+          </a:ln>
+        </p:spPr>
+        <p:txBody>
+          <a:bodyPr vert="horz" lIns="0" tIns="45720" rIns="0" bIns="45720" rtlCol="0">
+            <a:normAutofit lnSpcReduction="10000"/>
+          </a:bodyPr>
+          <a:lstStyle>
+            <a:lvl1pPr marL="91436" indent="-91436" algn="l" defTabSz="914354" rtl="0" eaLnBrk="1" latinLnBrk="0" hangingPunct="1">
+              <a:lnSpc>
+                <a:spcPct val="90000"/>
+              </a:lnSpc>
+              <a:spcBef>
+                <a:spcPts val="1200"/>
+              </a:spcBef>
+              <a:spcAft>
+                <a:spcPts val="200"/>
+              </a:spcAft>
+              <a:buClr>
+                <a:schemeClr val="accent1"/>
+              </a:buClr>
+              <a:buSzPct val="100000"/>
+              <a:buFont typeface="Calibri" panose="020F0502020204030204" pitchFamily="34" charset="0"/>
+              <a:buChar char=" "/>
+              <a:defRPr sz="2000" kern="1200">
+                <a:solidFill>
+                  <a:schemeClr val="tx1">
+                    <a:lumMod val="75000"/>
+                    <a:lumOff val="25000"/>
+                  </a:schemeClr>
+                </a:solidFill>
+                <a:latin typeface="+mn-lt"/>
+                <a:ea typeface="+mn-ea"/>
+                <a:cs typeface="+mn-cs"/>
+              </a:defRPr>
+            </a:lvl1pPr>
+            <a:lvl2pPr marL="384029" indent="-182870" algn="l" defTabSz="914354" rtl="0" eaLnBrk="1" latinLnBrk="0" hangingPunct="1">
+              <a:lnSpc>
+                <a:spcPct val="90000"/>
+              </a:lnSpc>
+              <a:spcBef>
+                <a:spcPts val="200"/>
+              </a:spcBef>
+              <a:spcAft>
+                <a:spcPts val="400"/>
+              </a:spcAft>
+              <a:buClr>
+                <a:schemeClr val="accent1"/>
+              </a:buClr>
+              <a:buFont typeface="Calibri" pitchFamily="34" charset="0"/>
+              <a:buChar char="◦"/>
+              <a:defRPr sz="1800" kern="1200">
+                <a:solidFill>
+                  <a:schemeClr val="tx1">
+                    <a:lumMod val="75000"/>
+                    <a:lumOff val="25000"/>
+                  </a:schemeClr>
+                </a:solidFill>
+                <a:latin typeface="+mn-lt"/>
+                <a:ea typeface="+mn-ea"/>
+                <a:cs typeface="+mn-cs"/>
+              </a:defRPr>
+            </a:lvl2pPr>
+            <a:lvl3pPr marL="566900" indent="-182870" algn="l" defTabSz="914354" rtl="0" eaLnBrk="1" latinLnBrk="0" hangingPunct="1">
+              <a:lnSpc>
+                <a:spcPct val="90000"/>
+              </a:lnSpc>
+              <a:spcBef>
+                <a:spcPts val="200"/>
+              </a:spcBef>
+              <a:spcAft>
+                <a:spcPts val="400"/>
+              </a:spcAft>
+              <a:buClr>
+                <a:schemeClr val="accent1"/>
+              </a:buClr>
+              <a:buFont typeface="Calibri" pitchFamily="34" charset="0"/>
+              <a:buChar char="◦"/>
+              <a:defRPr sz="1400" kern="1200">
+                <a:solidFill>
+                  <a:schemeClr val="tx1">
+                    <a:lumMod val="75000"/>
+                    <a:lumOff val="25000"/>
+                  </a:schemeClr>
+                </a:solidFill>
+                <a:latin typeface="+mn-lt"/>
+                <a:ea typeface="+mn-ea"/>
+                <a:cs typeface="+mn-cs"/>
+              </a:defRPr>
+            </a:lvl3pPr>
+            <a:lvl4pPr marL="749771" indent="-182870" algn="l" defTabSz="914354" rtl="0" eaLnBrk="1" latinLnBrk="0" hangingPunct="1">
+              <a:lnSpc>
+                <a:spcPct val="90000"/>
+              </a:lnSpc>
+              <a:spcBef>
+                <a:spcPts val="200"/>
+              </a:spcBef>
+              <a:spcAft>
+                <a:spcPts val="400"/>
+              </a:spcAft>
+              <a:buClr>
+                <a:schemeClr val="accent1"/>
+              </a:buClr>
+              <a:buFont typeface="Calibri" pitchFamily="34" charset="0"/>
+              <a:buChar char="◦"/>
+              <a:defRPr sz="1400" kern="1200">
+                <a:solidFill>
+                  <a:schemeClr val="tx1">
+                    <a:lumMod val="75000"/>
+                    <a:lumOff val="25000"/>
+                  </a:schemeClr>
+                </a:solidFill>
+                <a:latin typeface="+mn-lt"/>
+                <a:ea typeface="+mn-ea"/>
+                <a:cs typeface="+mn-cs"/>
+              </a:defRPr>
+            </a:lvl4pPr>
+            <a:lvl5pPr marL="932642" indent="-182870" algn="l" defTabSz="914354" rtl="0" eaLnBrk="1" latinLnBrk="0" hangingPunct="1">
+              <a:lnSpc>
+                <a:spcPct val="90000"/>
+              </a:lnSpc>
+              <a:spcBef>
+                <a:spcPts val="200"/>
+              </a:spcBef>
+              <a:spcAft>
+                <a:spcPts val="400"/>
+              </a:spcAft>
+              <a:buClr>
+                <a:schemeClr val="accent1"/>
+              </a:buClr>
+              <a:buFont typeface="Calibri" pitchFamily="34" charset="0"/>
+              <a:buChar char="◦"/>
+              <a:defRPr sz="1400" kern="1200">
+                <a:solidFill>
+                  <a:schemeClr val="tx1">
+                    <a:lumMod val="75000"/>
+                    <a:lumOff val="25000"/>
+                  </a:schemeClr>
+                </a:solidFill>
+                <a:latin typeface="+mn-lt"/>
+                <a:ea typeface="+mn-ea"/>
+                <a:cs typeface="+mn-cs"/>
+              </a:defRPr>
+            </a:lvl5pPr>
+            <a:lvl6pPr marL="1099946" indent="-228589" algn="l" defTabSz="914354" rtl="0" eaLnBrk="1" latinLnBrk="0" hangingPunct="1">
+              <a:lnSpc>
+                <a:spcPct val="90000"/>
+              </a:lnSpc>
+              <a:spcBef>
+                <a:spcPts val="200"/>
+              </a:spcBef>
+              <a:spcAft>
+                <a:spcPts val="400"/>
+              </a:spcAft>
+              <a:buClr>
+                <a:schemeClr val="accent1"/>
+              </a:buClr>
+              <a:buFont typeface="Calibri" pitchFamily="34" charset="0"/>
+              <a:buChar char="◦"/>
+              <a:defRPr sz="1400" kern="1200">
+                <a:solidFill>
+                  <a:schemeClr val="tx1">
+                    <a:lumMod val="75000"/>
+                    <a:lumOff val="25000"/>
+                  </a:schemeClr>
+                </a:solidFill>
+                <a:latin typeface="+mn-lt"/>
+                <a:ea typeface="+mn-ea"/>
+                <a:cs typeface="+mn-cs"/>
+              </a:defRPr>
+            </a:lvl6pPr>
+            <a:lvl7pPr marL="1299936" indent="-228589" algn="l" defTabSz="914354" rtl="0" eaLnBrk="1" latinLnBrk="0" hangingPunct="1">
+              <a:lnSpc>
+                <a:spcPct val="90000"/>
+              </a:lnSpc>
+              <a:spcBef>
+                <a:spcPts val="200"/>
+              </a:spcBef>
+              <a:spcAft>
+                <a:spcPts val="400"/>
+              </a:spcAft>
+              <a:buClr>
+                <a:schemeClr val="accent1"/>
+              </a:buClr>
+              <a:buFont typeface="Calibri" pitchFamily="34" charset="0"/>
+              <a:buChar char="◦"/>
+              <a:defRPr sz="1400" kern="1200">
+                <a:solidFill>
+                  <a:schemeClr val="tx1">
+                    <a:lumMod val="75000"/>
+                    <a:lumOff val="25000"/>
+                  </a:schemeClr>
+                </a:solidFill>
+                <a:latin typeface="+mn-lt"/>
+                <a:ea typeface="+mn-ea"/>
+                <a:cs typeface="+mn-cs"/>
+              </a:defRPr>
+            </a:lvl7pPr>
+            <a:lvl8pPr marL="1499925" indent="-228589" algn="l" defTabSz="914354" rtl="0" eaLnBrk="1" latinLnBrk="0" hangingPunct="1">
+              <a:lnSpc>
+                <a:spcPct val="90000"/>
+              </a:lnSpc>
+              <a:spcBef>
+                <a:spcPts val="200"/>
+              </a:spcBef>
+              <a:spcAft>
+                <a:spcPts val="400"/>
+              </a:spcAft>
+              <a:buClr>
+                <a:schemeClr val="accent1"/>
+              </a:buClr>
+              <a:buFont typeface="Calibri" pitchFamily="34" charset="0"/>
+              <a:buChar char="◦"/>
+              <a:defRPr sz="1400" kern="1200">
+                <a:solidFill>
+                  <a:schemeClr val="tx1">
+                    <a:lumMod val="75000"/>
+                    <a:lumOff val="25000"/>
+                  </a:schemeClr>
+                </a:solidFill>
+                <a:latin typeface="+mn-lt"/>
+                <a:ea typeface="+mn-ea"/>
+                <a:cs typeface="+mn-cs"/>
+              </a:defRPr>
+            </a:lvl8pPr>
+            <a:lvl9pPr marL="1699916" indent="-228589" algn="l" defTabSz="914354" rtl="0" eaLnBrk="1" latinLnBrk="0" hangingPunct="1">
+              <a:lnSpc>
+                <a:spcPct val="90000"/>
+              </a:lnSpc>
+              <a:spcBef>
+                <a:spcPts val="200"/>
+              </a:spcBef>
+              <a:spcAft>
+                <a:spcPts val="400"/>
+              </a:spcAft>
+              <a:buClr>
+                <a:schemeClr val="accent1"/>
+              </a:buClr>
+              <a:buFont typeface="Calibri" pitchFamily="34" charset="0"/>
+              <a:buChar char="◦"/>
+              <a:defRPr sz="1400" kern="1200">
+                <a:solidFill>
+                  <a:schemeClr val="tx1">
+                    <a:lumMod val="75000"/>
+                    <a:lumOff val="25000"/>
+                  </a:schemeClr>
+                </a:solidFill>
+                <a:latin typeface="+mn-lt"/>
+                <a:ea typeface="+mn-ea"/>
+                <a:cs typeface="+mn-cs"/>
+              </a:defRPr>
+            </a:lvl9pPr>
+          </a:lstStyle>
+          <a:p>
+            <a:pPr marL="266687" indent="-165092">
+              <a:buFont typeface="Wingdings" panose="05000000000000000000" pitchFamily="2" charset="2"/>
+              <a:buChar char="§"/>
+            </a:pPr>
+            <a:r>
+              <a:rPr lang="en-US" dirty="0" smtClean="0"/>
+              <a:t>Discuss fuel cell as an alternative</a:t>
+            </a:r>
+          </a:p>
+          <a:p>
+            <a:pPr marL="266687" indent="-165092">
+              <a:buFont typeface="Wingdings" panose="05000000000000000000" pitchFamily="2" charset="2"/>
+              <a:buChar char="§"/>
+            </a:pPr>
+            <a:r>
+              <a:rPr lang="en-US" dirty="0" smtClean="0"/>
+              <a:t>Give a short industry overview</a:t>
             </a:r>
           </a:p>
         </p:txBody>
@@ -10957,6 +11341,13 @@
             <a:solidFill>
               <a:schemeClr val="bg1"/>
             </a:solidFill>
+            <a:ln>
+              <a:solidFill>
+                <a:schemeClr val="bg1">
+                  <a:lumMod val="65000"/>
+                </a:schemeClr>
+              </a:solidFill>
+            </a:ln>
           </p:spPr>
           <p:style>
             <a:lnRef idx="2">
@@ -11343,6 +11734,13 @@
             <a:solidFill>
               <a:schemeClr val="bg1"/>
             </a:solidFill>
+            <a:ln>
+              <a:solidFill>
+                <a:schemeClr val="bg1">
+                  <a:lumMod val="65000"/>
+                </a:schemeClr>
+              </a:solidFill>
+            </a:ln>
           </p:spPr>
           <p:style>
             <a:lnRef idx="2">
@@ -11582,9 +11980,16 @@
         </p:nvSpPr>
         <p:spPr>
           <a:xfrm>
-            <a:off x="1097282" y="1845735"/>
-            <a:ext cx="3986537" cy="4023360"/>
+            <a:off x="1097282" y="1927859"/>
+            <a:ext cx="3986537" cy="3941235"/>
           </a:xfrm>
+          <a:ln>
+            <a:solidFill>
+              <a:schemeClr val="bg1">
+                <a:lumMod val="65000"/>
+              </a:schemeClr>
+            </a:solidFill>
+          </a:ln>
         </p:spPr>
         <p:txBody>
           <a:bodyPr/>
@@ -11596,6 +12001,10 @@
             </a:r>
           </a:p>
           <a:p>
+            <a:pPr marL="268288" indent="-174625">
+              <a:buFont typeface="Wingdings" panose="05000000000000000000" pitchFamily="2" charset="2"/>
+              <a:buChar char="§"/>
+            </a:pPr>
             <a:r>
               <a:rPr lang="en-US" noProof="0" dirty="0" smtClean="0"/>
               <a:t>Combine Hydrogen and Oxygen to produce electricity</a:t>
@@ -11611,11 +12020,14 @@
             </a:r>
           </a:p>
           <a:p>
+            <a:pPr marL="268288" indent="-174625">
+              <a:buFont typeface="Wingdings" panose="05000000000000000000" pitchFamily="2" charset="2"/>
+              <a:buChar char="§"/>
+            </a:pPr>
             <a:r>
               <a:rPr lang="en-US" noProof="0" dirty="0" smtClean="0"/>
               <a:t>Where to find Hydrogen?</a:t>
             </a:r>
-            <a:endParaRPr lang="en-US" noProof="0" dirty="0" smtClean="0"/>
           </a:p>
         </p:txBody>
       </p:sp>
@@ -11664,7 +12076,7 @@
           </p:cNvPicPr>
           <p:nvPr/>
         </p:nvPicPr>
-        <p:blipFill>
+        <p:blipFill rotWithShape="1">
           <a:blip r:embed="rId2">
             <a:duotone>
               <a:schemeClr val="accent2">
@@ -11679,18 +12091,24 @@
               </a:ext>
             </a:extLst>
           </a:blip>
-          <a:stretch>
-            <a:fillRect/>
-          </a:stretch>
+          <a:srcRect r="4456"/>
+          <a:stretch/>
         </p:blipFill>
         <p:spPr>
           <a:xfrm>
-            <a:off x="5208815" y="1832934"/>
-            <a:ext cx="6692056" cy="4022725"/>
+            <a:off x="5208815" y="1927859"/>
+            <a:ext cx="6257471" cy="3927800"/>
           </a:xfrm>
           <a:prstGeom prst="rect">
             <a:avLst/>
           </a:prstGeom>
+          <a:ln w="9525">
+            <a:solidFill>
+              <a:schemeClr val="bg1">
+                <a:lumMod val="65000"/>
+              </a:schemeClr>
+            </a:solidFill>
+          </a:ln>
         </p:spPr>
       </p:pic>
       <p:sp>
@@ -11718,50 +12136,313 @@
       </p:sp>
       <p:sp>
         <p:nvSpPr>
-          <p:cNvPr id="23" name="Espace réservé du contenu 22"/>
-          <p:cNvSpPr>
-            <a:spLocks noGrp="1"/>
+          <p:cNvPr id="6" name="Espace réservé du contenu 22"/>
+          <p:cNvSpPr txBox="1">
+            <a:spLocks/>
           </p:cNvSpPr>
-          <p:nvPr>
-            <p:ph idx="1"/>
-          </p:nvPr>
+          <p:nvPr/>
         </p:nvSpPr>
         <p:spPr>
           <a:xfrm>
-            <a:off x="1097282" y="1845735"/>
-            <a:ext cx="3986537" cy="4023360"/>
+            <a:off x="1097282" y="1927859"/>
+            <a:ext cx="3986537" cy="3941235"/>
           </a:xfrm>
+          <a:prstGeom prst="rect">
+            <a:avLst/>
+          </a:prstGeom>
+          <a:ln>
+            <a:solidFill>
+              <a:schemeClr val="bg1">
+                <a:lumMod val="65000"/>
+              </a:schemeClr>
+            </a:solidFill>
+          </a:ln>
         </p:spPr>
         <p:txBody>
-          <a:bodyPr/>
-          <a:lstStyle/>
+          <a:bodyPr vert="horz" lIns="0" tIns="45720" rIns="0" bIns="45720" rtlCol="0">
+            <a:normAutofit/>
+          </a:bodyPr>
+          <a:lstStyle>
+            <a:lvl1pPr marL="91436" indent="-91436" algn="l" defTabSz="914354" rtl="0" eaLnBrk="1" latinLnBrk="0" hangingPunct="1">
+              <a:lnSpc>
+                <a:spcPct val="90000"/>
+              </a:lnSpc>
+              <a:spcBef>
+                <a:spcPts val="1200"/>
+              </a:spcBef>
+              <a:spcAft>
+                <a:spcPts val="200"/>
+              </a:spcAft>
+              <a:buClr>
+                <a:schemeClr val="accent1"/>
+              </a:buClr>
+              <a:buSzPct val="100000"/>
+              <a:buFont typeface="Calibri" panose="020F0502020204030204" pitchFamily="34" charset="0"/>
+              <a:buChar char=" "/>
+              <a:defRPr sz="2000" kern="1200">
+                <a:solidFill>
+                  <a:schemeClr val="tx1">
+                    <a:lumMod val="75000"/>
+                    <a:lumOff val="25000"/>
+                  </a:schemeClr>
+                </a:solidFill>
+                <a:latin typeface="+mn-lt"/>
+                <a:ea typeface="+mn-ea"/>
+                <a:cs typeface="+mn-cs"/>
+              </a:defRPr>
+            </a:lvl1pPr>
+            <a:lvl2pPr marL="384029" indent="-182870" algn="l" defTabSz="914354" rtl="0" eaLnBrk="1" latinLnBrk="0" hangingPunct="1">
+              <a:lnSpc>
+                <a:spcPct val="90000"/>
+              </a:lnSpc>
+              <a:spcBef>
+                <a:spcPts val="200"/>
+              </a:spcBef>
+              <a:spcAft>
+                <a:spcPts val="400"/>
+              </a:spcAft>
+              <a:buClr>
+                <a:schemeClr val="accent1"/>
+              </a:buClr>
+              <a:buFont typeface="Calibri" pitchFamily="34" charset="0"/>
+              <a:buChar char="◦"/>
+              <a:defRPr sz="1800" kern="1200">
+                <a:solidFill>
+                  <a:schemeClr val="tx1">
+                    <a:lumMod val="75000"/>
+                    <a:lumOff val="25000"/>
+                  </a:schemeClr>
+                </a:solidFill>
+                <a:latin typeface="+mn-lt"/>
+                <a:ea typeface="+mn-ea"/>
+                <a:cs typeface="+mn-cs"/>
+              </a:defRPr>
+            </a:lvl2pPr>
+            <a:lvl3pPr marL="566900" indent="-182870" algn="l" defTabSz="914354" rtl="0" eaLnBrk="1" latinLnBrk="0" hangingPunct="1">
+              <a:lnSpc>
+                <a:spcPct val="90000"/>
+              </a:lnSpc>
+              <a:spcBef>
+                <a:spcPts val="200"/>
+              </a:spcBef>
+              <a:spcAft>
+                <a:spcPts val="400"/>
+              </a:spcAft>
+              <a:buClr>
+                <a:schemeClr val="accent1"/>
+              </a:buClr>
+              <a:buFont typeface="Calibri" pitchFamily="34" charset="0"/>
+              <a:buChar char="◦"/>
+              <a:defRPr sz="1400" kern="1200">
+                <a:solidFill>
+                  <a:schemeClr val="tx1">
+                    <a:lumMod val="75000"/>
+                    <a:lumOff val="25000"/>
+                  </a:schemeClr>
+                </a:solidFill>
+                <a:latin typeface="+mn-lt"/>
+                <a:ea typeface="+mn-ea"/>
+                <a:cs typeface="+mn-cs"/>
+              </a:defRPr>
+            </a:lvl3pPr>
+            <a:lvl4pPr marL="749771" indent="-182870" algn="l" defTabSz="914354" rtl="0" eaLnBrk="1" latinLnBrk="0" hangingPunct="1">
+              <a:lnSpc>
+                <a:spcPct val="90000"/>
+              </a:lnSpc>
+              <a:spcBef>
+                <a:spcPts val="200"/>
+              </a:spcBef>
+              <a:spcAft>
+                <a:spcPts val="400"/>
+              </a:spcAft>
+              <a:buClr>
+                <a:schemeClr val="accent1"/>
+              </a:buClr>
+              <a:buFont typeface="Calibri" pitchFamily="34" charset="0"/>
+              <a:buChar char="◦"/>
+              <a:defRPr sz="1400" kern="1200">
+                <a:solidFill>
+                  <a:schemeClr val="tx1">
+                    <a:lumMod val="75000"/>
+                    <a:lumOff val="25000"/>
+                  </a:schemeClr>
+                </a:solidFill>
+                <a:latin typeface="+mn-lt"/>
+                <a:ea typeface="+mn-ea"/>
+                <a:cs typeface="+mn-cs"/>
+              </a:defRPr>
+            </a:lvl4pPr>
+            <a:lvl5pPr marL="932642" indent="-182870" algn="l" defTabSz="914354" rtl="0" eaLnBrk="1" latinLnBrk="0" hangingPunct="1">
+              <a:lnSpc>
+                <a:spcPct val="90000"/>
+              </a:lnSpc>
+              <a:spcBef>
+                <a:spcPts val="200"/>
+              </a:spcBef>
+              <a:spcAft>
+                <a:spcPts val="400"/>
+              </a:spcAft>
+              <a:buClr>
+                <a:schemeClr val="accent1"/>
+              </a:buClr>
+              <a:buFont typeface="Calibri" pitchFamily="34" charset="0"/>
+              <a:buChar char="◦"/>
+              <a:defRPr sz="1400" kern="1200">
+                <a:solidFill>
+                  <a:schemeClr val="tx1">
+                    <a:lumMod val="75000"/>
+                    <a:lumOff val="25000"/>
+                  </a:schemeClr>
+                </a:solidFill>
+                <a:latin typeface="+mn-lt"/>
+                <a:ea typeface="+mn-ea"/>
+                <a:cs typeface="+mn-cs"/>
+              </a:defRPr>
+            </a:lvl5pPr>
+            <a:lvl6pPr marL="1099946" indent="-228589" algn="l" defTabSz="914354" rtl="0" eaLnBrk="1" latinLnBrk="0" hangingPunct="1">
+              <a:lnSpc>
+                <a:spcPct val="90000"/>
+              </a:lnSpc>
+              <a:spcBef>
+                <a:spcPts val="200"/>
+              </a:spcBef>
+              <a:spcAft>
+                <a:spcPts val="400"/>
+              </a:spcAft>
+              <a:buClr>
+                <a:schemeClr val="accent1"/>
+              </a:buClr>
+              <a:buFont typeface="Calibri" pitchFamily="34" charset="0"/>
+              <a:buChar char="◦"/>
+              <a:defRPr sz="1400" kern="1200">
+                <a:solidFill>
+                  <a:schemeClr val="tx1">
+                    <a:lumMod val="75000"/>
+                    <a:lumOff val="25000"/>
+                  </a:schemeClr>
+                </a:solidFill>
+                <a:latin typeface="+mn-lt"/>
+                <a:ea typeface="+mn-ea"/>
+                <a:cs typeface="+mn-cs"/>
+              </a:defRPr>
+            </a:lvl6pPr>
+            <a:lvl7pPr marL="1299936" indent="-228589" algn="l" defTabSz="914354" rtl="0" eaLnBrk="1" latinLnBrk="0" hangingPunct="1">
+              <a:lnSpc>
+                <a:spcPct val="90000"/>
+              </a:lnSpc>
+              <a:spcBef>
+                <a:spcPts val="200"/>
+              </a:spcBef>
+              <a:spcAft>
+                <a:spcPts val="400"/>
+              </a:spcAft>
+              <a:buClr>
+                <a:schemeClr val="accent1"/>
+              </a:buClr>
+              <a:buFont typeface="Calibri" pitchFamily="34" charset="0"/>
+              <a:buChar char="◦"/>
+              <a:defRPr sz="1400" kern="1200">
+                <a:solidFill>
+                  <a:schemeClr val="tx1">
+                    <a:lumMod val="75000"/>
+                    <a:lumOff val="25000"/>
+                  </a:schemeClr>
+                </a:solidFill>
+                <a:latin typeface="+mn-lt"/>
+                <a:ea typeface="+mn-ea"/>
+                <a:cs typeface="+mn-cs"/>
+              </a:defRPr>
+            </a:lvl7pPr>
+            <a:lvl8pPr marL="1499925" indent="-228589" algn="l" defTabSz="914354" rtl="0" eaLnBrk="1" latinLnBrk="0" hangingPunct="1">
+              <a:lnSpc>
+                <a:spcPct val="90000"/>
+              </a:lnSpc>
+              <a:spcBef>
+                <a:spcPts val="200"/>
+              </a:spcBef>
+              <a:spcAft>
+                <a:spcPts val="400"/>
+              </a:spcAft>
+              <a:buClr>
+                <a:schemeClr val="accent1"/>
+              </a:buClr>
+              <a:buFont typeface="Calibri" pitchFamily="34" charset="0"/>
+              <a:buChar char="◦"/>
+              <a:defRPr sz="1400" kern="1200">
+                <a:solidFill>
+                  <a:schemeClr val="tx1">
+                    <a:lumMod val="75000"/>
+                    <a:lumOff val="25000"/>
+                  </a:schemeClr>
+                </a:solidFill>
+                <a:latin typeface="+mn-lt"/>
+                <a:ea typeface="+mn-ea"/>
+                <a:cs typeface="+mn-cs"/>
+              </a:defRPr>
+            </a:lvl8pPr>
+            <a:lvl9pPr marL="1699916" indent="-228589" algn="l" defTabSz="914354" rtl="0" eaLnBrk="1" latinLnBrk="0" hangingPunct="1">
+              <a:lnSpc>
+                <a:spcPct val="90000"/>
+              </a:lnSpc>
+              <a:spcBef>
+                <a:spcPts val="200"/>
+              </a:spcBef>
+              <a:spcAft>
+                <a:spcPts val="400"/>
+              </a:spcAft>
+              <a:buClr>
+                <a:schemeClr val="accent1"/>
+              </a:buClr>
+              <a:buFont typeface="Calibri" pitchFamily="34" charset="0"/>
+              <a:buChar char="◦"/>
+              <a:defRPr sz="1400" kern="1200">
+                <a:solidFill>
+                  <a:schemeClr val="tx1">
+                    <a:lumMod val="75000"/>
+                    <a:lumOff val="25000"/>
+                  </a:schemeClr>
+                </a:solidFill>
+                <a:latin typeface="+mn-lt"/>
+                <a:ea typeface="+mn-ea"/>
+                <a:cs typeface="+mn-cs"/>
+              </a:defRPr>
+            </a:lvl9pPr>
+          </a:lstStyle>
           <a:p>
             <a:r>
-              <a:rPr lang="en-US" sz="2400" dirty="0"/>
+              <a:rPr lang="en-US" sz="2400" smtClean="0"/>
               <a:t>MAIN PRINCIPLE</a:t>
             </a:r>
           </a:p>
           <a:p>
-            <a:r>
-              <a:rPr lang="en-US" noProof="0" dirty="0" smtClean="0"/>
+            <a:pPr marL="268288" indent="-174625">
+              <a:buFont typeface="Wingdings" panose="05000000000000000000" pitchFamily="2" charset="2"/>
+              <a:buChar char="§"/>
+            </a:pPr>
+            <a:r>
+              <a:rPr lang="en-US" smtClean="0"/>
               <a:t>Combine Hydrogen and Oxygen to produce electricity</a:t>
             </a:r>
           </a:p>
           <a:p>
-            <a:endParaRPr lang="en-US" noProof="0" dirty="0" smtClean="0"/>
+            <a:endParaRPr lang="en-US" smtClean="0"/>
           </a:p>
           <a:p>
             <a:r>
-              <a:rPr lang="en-US" sz="2400" dirty="0"/>
+              <a:rPr lang="en-US" sz="2400" smtClean="0"/>
               <a:t>PROBLEM</a:t>
             </a:r>
           </a:p>
           <a:p>
-            <a:r>
-              <a:rPr lang="en-US" noProof="0" dirty="0" smtClean="0"/>
+            <a:pPr marL="268288" indent="-174625">
+              <a:buFont typeface="Wingdings" panose="05000000000000000000" pitchFamily="2" charset="2"/>
+              <a:buChar char="§"/>
+            </a:pPr>
+            <a:r>
+              <a:rPr lang="en-US" smtClean="0"/>
               <a:t>Where to find Hydrogen?</a:t>
             </a:r>
-            <a:endParaRPr lang="en-US" noProof="0" dirty="0" smtClean="0"/>
+            <a:endParaRPr lang="en-US" dirty="0" smtClean="0"/>
           </a:p>
         </p:txBody>
       </p:sp>
@@ -11842,7 +12523,7 @@
         </p:nvGraphicFramePr>
         <p:xfrm>
           <a:off x="1096963" y="1846263"/>
-          <a:ext cx="10058400" cy="2974848"/>
+          <a:ext cx="10058400" cy="3035808"/>
         </p:xfrm>
         <a:graphic>
           <a:graphicData uri="http://schemas.openxmlformats.org/drawingml/2006/table">
@@ -12861,11 +13542,7 @@
               </a:r>
               <a:r>
                 <a:rPr lang="fr-FR" dirty="0" err="1"/>
-                <a:t>m</a:t>
-              </a:r>
-              <a:r>
-                <a:rPr lang="fr-FR" dirty="0" err="1"/>
-                <a:t>etals</a:t>
+                <a:t>metals</a:t>
               </a:r>
               <a:endParaRPr lang="fr-FR" dirty="0"/>
             </a:p>
@@ -14171,7 +14848,7 @@
         </p:nvGraphicFramePr>
         <p:xfrm>
           <a:off x="1096963" y="1846263"/>
-          <a:ext cx="10058400" cy="4185920"/>
+          <a:ext cx="10058400" cy="4409440"/>
         </p:xfrm>
         <a:graphic>
           <a:graphicData uri="http://schemas.openxmlformats.org/drawingml/2006/table">
@@ -15362,7 +16039,7 @@
       </p:grpSpPr>
       <p:sp>
         <p:nvSpPr>
-          <p:cNvPr id="2" name="标题 1"/>
+          <p:cNvPr id="2" name="Title 1"/>
           <p:cNvSpPr>
             <a:spLocks noGrp="1"/>
           </p:cNvSpPr>
@@ -15376,55 +16053,130 @@
           <a:lstStyle/>
           <a:p>
             <a:r>
-              <a:rPr lang="en-US" altLang="zh-CN" noProof="0" dirty="0" smtClean="0"/>
-              <a:t>LOGIC MODEL</a:t>
-            </a:r>
-            <a:endParaRPr lang="en-US" altLang="zh-CN" noProof="0" dirty="0"/>
+              <a:rPr lang="en-US" dirty="0" smtClean="0"/>
+              <a:t>Law and governmental influence</a:t>
+            </a:r>
+            <a:endParaRPr lang="en-US" dirty="0"/>
           </a:p>
         </p:txBody>
       </p:sp>
-      <p:graphicFrame>
-        <p:nvGraphicFramePr>
-          <p:cNvPr id="4" name="Espace réservé du contenu 3"/>
-          <p:cNvGraphicFramePr>
-            <a:graphicFrameLocks noGrp="1"/>
-          </p:cNvGraphicFramePr>
+      <p:sp>
+        <p:nvSpPr>
+          <p:cNvPr id="3" name="Content Placeholder 2"/>
+          <p:cNvSpPr>
+            <a:spLocks noGrp="1"/>
+          </p:cNvSpPr>
           <p:nvPr>
             <p:ph idx="1"/>
-            <p:extLst>
-              <p:ext uri="{D42A27DB-BD31-4B8C-83A1-F6EECF244321}">
-                <p14:modId xmlns:p14="http://schemas.microsoft.com/office/powerpoint/2010/main" val="223621739"/>
-              </p:ext>
-            </p:extLst>
           </p:nvPr>
-        </p:nvGraphicFramePr>
-        <p:xfrm>
-          <a:off x="1096963" y="1846270"/>
-          <a:ext cx="10058400" cy="4022725"/>
-        </p:xfrm>
-        <a:graphic>
-          <a:graphicData uri="http://schemas.openxmlformats.org/drawingml/2006/diagram">
-            <dgm:relIds xmlns:dgm="http://schemas.openxmlformats.org/drawingml/2006/diagram" xmlns:r="http://schemas.openxmlformats.org/officeDocument/2006/relationships" r:dm="rId2" r:lo="rId3" r:qs="rId4" r:cs="rId5"/>
-          </a:graphicData>
-        </a:graphic>
-      </p:graphicFrame>
+        </p:nvSpPr>
+        <p:spPr>
+          <a:xfrm>
+            <a:off x="1097280" y="1961848"/>
+            <a:ext cx="4897120" cy="2450495"/>
+          </a:xfrm>
+          <a:ln>
+            <a:solidFill>
+              <a:schemeClr val="bg1">
+                <a:lumMod val="65000"/>
+              </a:schemeClr>
+            </a:solidFill>
+          </a:ln>
+        </p:spPr>
+        <p:txBody>
+          <a:bodyPr>
+            <a:normAutofit/>
+          </a:bodyPr>
+          <a:lstStyle/>
+          <a:p>
+            <a:pPr marL="174625" indent="-174625">
+              <a:buFont typeface="Wingdings" panose="05000000000000000000" pitchFamily="2" charset="2"/>
+              <a:buChar char="§"/>
+            </a:pPr>
+            <a:r>
+              <a:rPr lang="en-US" dirty="0" smtClean="0"/>
+              <a:t>Compare institutional environment</a:t>
+            </a:r>
+          </a:p>
+          <a:p>
+            <a:pPr marL="174625" indent="-174625">
+              <a:buFont typeface="Wingdings" panose="05000000000000000000" pitchFamily="2" charset="2"/>
+              <a:buChar char="§"/>
+            </a:pPr>
+            <a:r>
+              <a:rPr lang="en-US" dirty="0" smtClean="0"/>
+              <a:t>Starting point for research: USA, Japan, Germany (EU)</a:t>
+            </a:r>
+          </a:p>
+          <a:p>
+            <a:pPr marL="174625" indent="-174625">
+              <a:buFont typeface="Wingdings" panose="05000000000000000000" pitchFamily="2" charset="2"/>
+              <a:buChar char="§"/>
+            </a:pPr>
+            <a:r>
+              <a:rPr lang="en-US" dirty="0" smtClean="0"/>
+              <a:t>Including subsidies and other governmental support or discouragement</a:t>
+            </a:r>
+            <a:endParaRPr lang="en-US" dirty="0"/>
+          </a:p>
+        </p:txBody>
+      </p:sp>
+      <p:pic>
+        <p:nvPicPr>
+          <p:cNvPr id="1026" name="Picture 2" descr="http://ars.els-cdn.com/content/image/1-s2.0-S0360544208002144-gr7.jpg"/>
+          <p:cNvPicPr>
+            <a:picLocks noChangeAspect="1" noChangeArrowheads="1"/>
+          </p:cNvPicPr>
+          <p:nvPr/>
+        </p:nvPicPr>
+        <p:blipFill rotWithShape="1">
+          <a:blip r:embed="rId2">
+            <a:extLst>
+              <a:ext uri="{28A0092B-C50C-407E-A947-70E740481C1C}">
+                <a14:useLocalDpi xmlns:a14="http://schemas.microsoft.com/office/drawing/2010/main" val="0"/>
+              </a:ext>
+            </a:extLst>
+          </a:blip>
+          <a:srcRect l="-1179" t="-3563" r="-3651" b="-1845"/>
+          <a:stretch/>
+        </p:blipFill>
+        <p:spPr bwMode="auto">
+          <a:xfrm>
+            <a:off x="6212115" y="1961848"/>
+            <a:ext cx="5066937" cy="3077029"/>
+          </a:xfrm>
+          <a:prstGeom prst="rect">
+            <a:avLst/>
+          </a:prstGeom>
+          <a:noFill/>
+          <a:ln>
+            <a:solidFill>
+              <a:schemeClr val="bg1">
+                <a:lumMod val="65000"/>
+              </a:schemeClr>
+            </a:solidFill>
+          </a:ln>
+          <a:extLst>
+            <a:ext uri="{909E8E84-426E-40DD-AFC4-6F175D3DCCD1}">
+              <a14:hiddenFill xmlns:a14="http://schemas.microsoft.com/office/drawing/2010/main">
+                <a:solidFill>
+                  <a:srgbClr val="FFFFFF"/>
+                </a:solidFill>
+              </a14:hiddenFill>
+            </a:ext>
+          </a:extLst>
+        </p:spPr>
+      </p:pic>
     </p:spTree>
     <p:extLst>
       <p:ext uri="{BB962C8B-B14F-4D97-AF65-F5344CB8AC3E}">
-        <p14:creationId xmlns:p14="http://schemas.microsoft.com/office/powerpoint/2010/main" val="1942553195"/>
+        <p14:creationId xmlns:p14="http://schemas.microsoft.com/office/powerpoint/2010/main" val="1021945082"/>
       </p:ext>
     </p:extLst>
   </p:cSld>
   <p:clrMapOvr>
     <a:masterClrMapping/>
   </p:clrMapOvr>
-  <p:timing>
-    <p:tnLst>
-      <p:par>
-        <p:cTn id="1" dur="indefinite" restart="never" nodeType="tmRoot"/>
-      </p:par>
-    </p:tnLst>
-  </p:timing>
 </p:sld>
 </file>
 

</xml_diff>